<commit_message>
#17 checking menu mockup
</commit_message>
<xml_diff>
--- a/docs/COMPONENT-DIAGRAM..pptx
+++ b/docs/COMPONENT-DIAGRAM..pptx
@@ -243,7 +243,7 @@
           <a:p>
             <a:fld id="{28BE630F-C39C-4DB9-8258-0B48CA067079}" type="datetimeFigureOut">
               <a:rPr lang="en-US" smtClean="0"/>
-              <a:t>11/29/2021</a:t>
+              <a:t>11/28/2021</a:t>
             </a:fld>
             <a:endParaRPr lang="en-US"/>
           </a:p>
@@ -411,7 +411,7 @@
           <a:p>
             <a:fld id="{28BE630F-C39C-4DB9-8258-0B48CA067079}" type="datetimeFigureOut">
               <a:rPr lang="en-US" smtClean="0"/>
-              <a:t>11/29/2021</a:t>
+              <a:t>11/28/2021</a:t>
             </a:fld>
             <a:endParaRPr lang="en-US"/>
           </a:p>
@@ -589,7 +589,7 @@
           <a:p>
             <a:fld id="{28BE630F-C39C-4DB9-8258-0B48CA067079}" type="datetimeFigureOut">
               <a:rPr lang="en-US" smtClean="0"/>
-              <a:t>11/29/2021</a:t>
+              <a:t>11/28/2021</a:t>
             </a:fld>
             <a:endParaRPr lang="en-US"/>
           </a:p>
@@ -757,7 +757,7 @@
           <a:p>
             <a:fld id="{28BE630F-C39C-4DB9-8258-0B48CA067079}" type="datetimeFigureOut">
               <a:rPr lang="en-US" smtClean="0"/>
-              <a:t>11/29/2021</a:t>
+              <a:t>11/28/2021</a:t>
             </a:fld>
             <a:endParaRPr lang="en-US"/>
           </a:p>
@@ -1002,7 +1002,7 @@
           <a:p>
             <a:fld id="{28BE630F-C39C-4DB9-8258-0B48CA067079}" type="datetimeFigureOut">
               <a:rPr lang="en-US" smtClean="0"/>
-              <a:t>11/29/2021</a:t>
+              <a:t>11/28/2021</a:t>
             </a:fld>
             <a:endParaRPr lang="en-US"/>
           </a:p>
@@ -1231,7 +1231,7 @@
           <a:p>
             <a:fld id="{28BE630F-C39C-4DB9-8258-0B48CA067079}" type="datetimeFigureOut">
               <a:rPr lang="en-US" smtClean="0"/>
-              <a:t>11/29/2021</a:t>
+              <a:t>11/28/2021</a:t>
             </a:fld>
             <a:endParaRPr lang="en-US"/>
           </a:p>
@@ -1595,7 +1595,7 @@
           <a:p>
             <a:fld id="{28BE630F-C39C-4DB9-8258-0B48CA067079}" type="datetimeFigureOut">
               <a:rPr lang="en-US" smtClean="0"/>
-              <a:t>11/29/2021</a:t>
+              <a:t>11/28/2021</a:t>
             </a:fld>
             <a:endParaRPr lang="en-US"/>
           </a:p>
@@ -1712,7 +1712,7 @@
           <a:p>
             <a:fld id="{28BE630F-C39C-4DB9-8258-0B48CA067079}" type="datetimeFigureOut">
               <a:rPr lang="en-US" smtClean="0"/>
-              <a:t>11/29/2021</a:t>
+              <a:t>11/28/2021</a:t>
             </a:fld>
             <a:endParaRPr lang="en-US"/>
           </a:p>
@@ -1807,7 +1807,7 @@
           <a:p>
             <a:fld id="{28BE630F-C39C-4DB9-8258-0B48CA067079}" type="datetimeFigureOut">
               <a:rPr lang="en-US" smtClean="0"/>
-              <a:t>11/29/2021</a:t>
+              <a:t>11/28/2021</a:t>
             </a:fld>
             <a:endParaRPr lang="en-US"/>
           </a:p>
@@ -2082,7 +2082,7 @@
           <a:p>
             <a:fld id="{28BE630F-C39C-4DB9-8258-0B48CA067079}" type="datetimeFigureOut">
               <a:rPr lang="en-US" smtClean="0"/>
-              <a:t>11/29/2021</a:t>
+              <a:t>11/28/2021</a:t>
             </a:fld>
             <a:endParaRPr lang="en-US"/>
           </a:p>
@@ -2334,7 +2334,7 @@
           <a:p>
             <a:fld id="{28BE630F-C39C-4DB9-8258-0B48CA067079}" type="datetimeFigureOut">
               <a:rPr lang="en-US" smtClean="0"/>
-              <a:t>11/29/2021</a:t>
+              <a:t>11/28/2021</a:t>
             </a:fld>
             <a:endParaRPr lang="en-US"/>
           </a:p>
@@ -2545,7 +2545,7 @@
           <a:p>
             <a:fld id="{28BE630F-C39C-4DB9-8258-0B48CA067079}" type="datetimeFigureOut">
               <a:rPr lang="en-US" smtClean="0"/>
-              <a:t>11/29/2021</a:t>
+              <a:t>11/28/2021</a:t>
             </a:fld>
             <a:endParaRPr lang="en-US"/>
           </a:p>
@@ -5079,7 +5079,7 @@
         <p:spPr>
           <a:xfrm>
             <a:off x="1893841" y="5004958"/>
-            <a:ext cx="866519" cy="369332"/>
+            <a:ext cx="944554" cy="369332"/>
           </a:xfrm>
           <a:prstGeom prst="rect">
             <a:avLst/>
@@ -5098,7 +5098,7 @@
                   <a:srgbClr val="FF0000"/>
                 </a:solidFill>
               </a:rPr>
-              <a:t>&lt;Even&gt;</a:t>
+              <a:t>&lt;Event&gt;</a:t>
             </a:r>
           </a:p>
         </p:txBody>
@@ -5118,7 +5118,7 @@
         <p:spPr>
           <a:xfrm>
             <a:off x="5317675" y="4970773"/>
-            <a:ext cx="1403013" cy="369332"/>
+            <a:ext cx="1184107" cy="369332"/>
           </a:xfrm>
           <a:prstGeom prst="rect">
             <a:avLst/>
@@ -5137,7 +5137,7 @@
                   <a:srgbClr val="FF0000"/>
                 </a:solidFill>
               </a:rPr>
-              <a:t>&lt;FindEvent&gt;</a:t>
+              <a:t>&lt;allevent&gt;</a:t>
             </a:r>
           </a:p>
         </p:txBody>
@@ -5210,7 +5210,7 @@
         <p:spPr>
           <a:xfrm>
             <a:off x="9281941" y="4303501"/>
-            <a:ext cx="1257908" cy="369332"/>
+            <a:ext cx="1408719" cy="369332"/>
           </a:xfrm>
           <a:prstGeom prst="rect">
             <a:avLst/>
@@ -5229,7 +5229,7 @@
                   <a:srgbClr val="FF0000"/>
                 </a:solidFill>
               </a:rPr>
-              <a:t>&lt;category&gt;</a:t>
+              <a:t>&lt;categories&gt;</a:t>
             </a:r>
           </a:p>
         </p:txBody>
@@ -5654,7 +5654,7 @@
         <p:spPr>
           <a:xfrm>
             <a:off x="8820304" y="5271598"/>
-            <a:ext cx="2563907" cy="303481"/>
+            <a:ext cx="2680093" cy="303481"/>
           </a:xfrm>
           <a:prstGeom prst="rect">
             <a:avLst/>
@@ -5677,7 +5677,7 @@
                   <a:srgbClr val="FF0000"/>
                 </a:solidFill>
               </a:rPr>
-              <a:t>category </a:t>
+              <a:t>categories </a:t>
             </a:r>
             <a:r>
               <a:rPr lang="en-US" sz="1372" dirty="0">
@@ -5708,7 +5708,7 @@
         <p:spPr>
           <a:xfrm>
             <a:off x="4727382" y="5930702"/>
-            <a:ext cx="2629181" cy="303481"/>
+            <a:ext cx="2515369" cy="303481"/>
           </a:xfrm>
           <a:prstGeom prst="rect">
             <a:avLst/>
@@ -5731,7 +5731,7 @@
                   <a:srgbClr val="FF0000"/>
                 </a:solidFill>
               </a:rPr>
-              <a:t>findevent </a:t>
+              <a:t>allevent </a:t>
             </a:r>
             <a:r>
               <a:rPr lang="en-US" sz="1372" dirty="0">
@@ -5762,7 +5762,7 @@
         <p:spPr>
           <a:xfrm>
             <a:off x="1072545" y="5847686"/>
-            <a:ext cx="2350259" cy="303481"/>
+            <a:ext cx="2441117" cy="303481"/>
           </a:xfrm>
           <a:prstGeom prst="rect">
             <a:avLst/>
@@ -5785,7 +5785,7 @@
                   <a:srgbClr val="FF0000"/>
                 </a:solidFill>
               </a:rPr>
-              <a:t>event </a:t>
+              <a:t>envent </a:t>
             </a:r>
             <a:r>
               <a:rPr lang="en-US" sz="1372" dirty="0">

</xml_diff>

<commit_message>
#39 update Cd on Event
</commit_message>
<xml_diff>
--- a/docs/COMPONENT-DIAGRAM..pptx
+++ b/docs/COMPONENT-DIAGRAM..pptx
@@ -8,6 +8,7 @@
     <p:sldId id="256" r:id="rId2"/>
     <p:sldId id="259" r:id="rId3"/>
     <p:sldId id="260" r:id="rId4"/>
+    <p:sldId id="257" r:id="rId5"/>
   </p:sldIdLst>
   <p:sldSz cx="12192000" cy="6858000"/>
   <p:notesSz cx="6858000" cy="9144000"/>
@@ -243,7 +244,7 @@
           <a:p>
             <a:fld id="{28BE630F-C39C-4DB9-8258-0B48CA067079}" type="datetimeFigureOut">
               <a:rPr lang="en-US" smtClean="0"/>
-              <a:t>11/29/2021</a:t>
+              <a:t>12/3/2021</a:t>
             </a:fld>
             <a:endParaRPr lang="en-US"/>
           </a:p>
@@ -411,7 +412,7 @@
           <a:p>
             <a:fld id="{28BE630F-C39C-4DB9-8258-0B48CA067079}" type="datetimeFigureOut">
               <a:rPr lang="en-US" smtClean="0"/>
-              <a:t>11/29/2021</a:t>
+              <a:t>12/3/2021</a:t>
             </a:fld>
             <a:endParaRPr lang="en-US"/>
           </a:p>
@@ -589,7 +590,7 @@
           <a:p>
             <a:fld id="{28BE630F-C39C-4DB9-8258-0B48CA067079}" type="datetimeFigureOut">
               <a:rPr lang="en-US" smtClean="0"/>
-              <a:t>11/29/2021</a:t>
+              <a:t>12/3/2021</a:t>
             </a:fld>
             <a:endParaRPr lang="en-US"/>
           </a:p>
@@ -757,7 +758,7 @@
           <a:p>
             <a:fld id="{28BE630F-C39C-4DB9-8258-0B48CA067079}" type="datetimeFigureOut">
               <a:rPr lang="en-US" smtClean="0"/>
-              <a:t>11/29/2021</a:t>
+              <a:t>12/3/2021</a:t>
             </a:fld>
             <a:endParaRPr lang="en-US"/>
           </a:p>
@@ -1002,7 +1003,7 @@
           <a:p>
             <a:fld id="{28BE630F-C39C-4DB9-8258-0B48CA067079}" type="datetimeFigureOut">
               <a:rPr lang="en-US" smtClean="0"/>
-              <a:t>11/29/2021</a:t>
+              <a:t>12/3/2021</a:t>
             </a:fld>
             <a:endParaRPr lang="en-US"/>
           </a:p>
@@ -1231,7 +1232,7 @@
           <a:p>
             <a:fld id="{28BE630F-C39C-4DB9-8258-0B48CA067079}" type="datetimeFigureOut">
               <a:rPr lang="en-US" smtClean="0"/>
-              <a:t>11/29/2021</a:t>
+              <a:t>12/3/2021</a:t>
             </a:fld>
             <a:endParaRPr lang="en-US"/>
           </a:p>
@@ -1595,7 +1596,7 @@
           <a:p>
             <a:fld id="{28BE630F-C39C-4DB9-8258-0B48CA067079}" type="datetimeFigureOut">
               <a:rPr lang="en-US" smtClean="0"/>
-              <a:t>11/29/2021</a:t>
+              <a:t>12/3/2021</a:t>
             </a:fld>
             <a:endParaRPr lang="en-US"/>
           </a:p>
@@ -1712,7 +1713,7 @@
           <a:p>
             <a:fld id="{28BE630F-C39C-4DB9-8258-0B48CA067079}" type="datetimeFigureOut">
               <a:rPr lang="en-US" smtClean="0"/>
-              <a:t>11/29/2021</a:t>
+              <a:t>12/3/2021</a:t>
             </a:fld>
             <a:endParaRPr lang="en-US"/>
           </a:p>
@@ -1807,7 +1808,7 @@
           <a:p>
             <a:fld id="{28BE630F-C39C-4DB9-8258-0B48CA067079}" type="datetimeFigureOut">
               <a:rPr lang="en-US" smtClean="0"/>
-              <a:t>11/29/2021</a:t>
+              <a:t>12/3/2021</a:t>
             </a:fld>
             <a:endParaRPr lang="en-US"/>
           </a:p>
@@ -2082,7 +2083,7 @@
           <a:p>
             <a:fld id="{28BE630F-C39C-4DB9-8258-0B48CA067079}" type="datetimeFigureOut">
               <a:rPr lang="en-US" smtClean="0"/>
-              <a:t>11/29/2021</a:t>
+              <a:t>12/3/2021</a:t>
             </a:fld>
             <a:endParaRPr lang="en-US"/>
           </a:p>
@@ -2334,7 +2335,7 @@
           <a:p>
             <a:fld id="{28BE630F-C39C-4DB9-8258-0B48CA067079}" type="datetimeFigureOut">
               <a:rPr lang="en-US" smtClean="0"/>
-              <a:t>11/29/2021</a:t>
+              <a:t>12/3/2021</a:t>
             </a:fld>
             <a:endParaRPr lang="en-US"/>
           </a:p>
@@ -2545,7 +2546,7 @@
           <a:p>
             <a:fld id="{28BE630F-C39C-4DB9-8258-0B48CA067079}" type="datetimeFigureOut">
               <a:rPr lang="en-US" smtClean="0"/>
-              <a:t>11/29/2021</a:t>
+              <a:t>12/3/2021</a:t>
             </a:fld>
             <a:endParaRPr lang="en-US"/>
           </a:p>
@@ -6394,6 +6395,1969 @@
 </p:sld>
 </file>
 
+<file path=ppt/slides/slide4.xml><?xml version="1.0" encoding="utf-8"?>
+<p:sld xmlns:a="http://schemas.openxmlformats.org/drawingml/2006/main" xmlns:r="http://schemas.openxmlformats.org/officeDocument/2006/relationships" xmlns:p="http://schemas.openxmlformats.org/presentationml/2006/main">
+  <p:cSld>
+    <p:spTree>
+      <p:nvGrpSpPr>
+        <p:cNvPr id="1" name=""/>
+        <p:cNvGrpSpPr/>
+        <p:nvPr/>
+      </p:nvGrpSpPr>
+      <p:grpSpPr>
+        <a:xfrm>
+          <a:off x="0" y="0"/>
+          <a:ext cx="0" cy="0"/>
+          <a:chOff x="0" y="0"/>
+          <a:chExt cx="0" cy="0"/>
+        </a:xfrm>
+      </p:grpSpPr>
+      <p:sp>
+        <p:nvSpPr>
+          <p:cNvPr id="31" name="Rounded Rectangle 4">
+            <a:extLst>
+              <a:ext uri="{FF2B5EF4-FFF2-40B4-BE49-F238E27FC236}">
+                <a16:creationId xmlns:a16="http://schemas.microsoft.com/office/drawing/2014/main" id="{FA249787-AC0F-4D4A-A6D4-2BE1720A0799}"/>
+              </a:ext>
+            </a:extLst>
+          </p:cNvPr>
+          <p:cNvSpPr/>
+          <p:nvPr/>
+        </p:nvSpPr>
+        <p:spPr>
+          <a:xfrm>
+            <a:off x="168574" y="3313028"/>
+            <a:ext cx="2232778" cy="1075794"/>
+          </a:xfrm>
+          <a:prstGeom prst="roundRect">
+            <a:avLst/>
+          </a:prstGeom>
+          <a:noFill/>
+          <a:ln>
+            <a:solidFill>
+              <a:srgbClr val="FF0000"/>
+            </a:solidFill>
+            <a:prstDash val="lgDash"/>
+          </a:ln>
+        </p:spPr>
+        <p:style>
+          <a:lnRef idx="2">
+            <a:schemeClr val="accent1">
+              <a:shade val="50000"/>
+            </a:schemeClr>
+          </a:lnRef>
+          <a:fillRef idx="1">
+            <a:schemeClr val="accent1"/>
+          </a:fillRef>
+          <a:effectRef idx="0">
+            <a:schemeClr val="accent1"/>
+          </a:effectRef>
+          <a:fontRef idx="minor">
+            <a:schemeClr val="lt1"/>
+          </a:fontRef>
+        </p:style>
+        <p:txBody>
+          <a:bodyPr rtlCol="0" anchor="ctr"/>
+          <a:lstStyle/>
+          <a:p>
+            <a:pPr algn="ctr"/>
+            <a:endParaRPr lang="en-US" sz="1372" dirty="0"/>
+          </a:p>
+        </p:txBody>
+      </p:sp>
+      <p:sp>
+        <p:nvSpPr>
+          <p:cNvPr id="32" name="Rounded Rectangle 4">
+            <a:extLst>
+              <a:ext uri="{FF2B5EF4-FFF2-40B4-BE49-F238E27FC236}">
+                <a16:creationId xmlns:a16="http://schemas.microsoft.com/office/drawing/2014/main" id="{A4DF2614-105E-408F-8D55-FF43BCF46884}"/>
+              </a:ext>
+            </a:extLst>
+          </p:cNvPr>
+          <p:cNvSpPr/>
+          <p:nvPr/>
+        </p:nvSpPr>
+        <p:spPr>
+          <a:xfrm>
+            <a:off x="4213612" y="1348241"/>
+            <a:ext cx="2232778" cy="5422826"/>
+          </a:xfrm>
+          <a:prstGeom prst="roundRect">
+            <a:avLst/>
+          </a:prstGeom>
+          <a:noFill/>
+          <a:ln>
+            <a:solidFill>
+              <a:srgbClr val="FF0000"/>
+            </a:solidFill>
+            <a:prstDash val="lgDash"/>
+          </a:ln>
+        </p:spPr>
+        <p:style>
+          <a:lnRef idx="2">
+            <a:schemeClr val="accent1">
+              <a:shade val="50000"/>
+            </a:schemeClr>
+          </a:lnRef>
+          <a:fillRef idx="1">
+            <a:schemeClr val="accent1"/>
+          </a:fillRef>
+          <a:effectRef idx="0">
+            <a:schemeClr val="accent1"/>
+          </a:effectRef>
+          <a:fontRef idx="minor">
+            <a:schemeClr val="lt1"/>
+          </a:fontRef>
+        </p:style>
+        <p:txBody>
+          <a:bodyPr rtlCol="0" anchor="ctr"/>
+          <a:lstStyle/>
+          <a:p>
+            <a:pPr algn="ctr"/>
+            <a:endParaRPr lang="en-US" sz="1372" dirty="0"/>
+          </a:p>
+        </p:txBody>
+      </p:sp>
+      <p:sp>
+        <p:nvSpPr>
+          <p:cNvPr id="33" name="Rectangle 32">
+            <a:extLst>
+              <a:ext uri="{FF2B5EF4-FFF2-40B4-BE49-F238E27FC236}">
+                <a16:creationId xmlns:a16="http://schemas.microsoft.com/office/drawing/2014/main" id="{03C6F02B-E8FE-49E5-84E0-5AE3F2839ADA}"/>
+              </a:ext>
+            </a:extLst>
+          </p:cNvPr>
+          <p:cNvSpPr/>
+          <p:nvPr/>
+        </p:nvSpPr>
+        <p:spPr>
+          <a:xfrm>
+            <a:off x="753933" y="3618046"/>
+            <a:ext cx="1062060" cy="465757"/>
+          </a:xfrm>
+          <a:prstGeom prst="rect">
+            <a:avLst/>
+          </a:prstGeom>
+          <a:solidFill>
+            <a:schemeClr val="bg1"/>
+          </a:solidFill>
+          <a:ln>
+            <a:solidFill>
+              <a:schemeClr val="bg1"/>
+            </a:solidFill>
+          </a:ln>
+        </p:spPr>
+        <p:style>
+          <a:lnRef idx="2">
+            <a:schemeClr val="accent1">
+              <a:shade val="50000"/>
+            </a:schemeClr>
+          </a:lnRef>
+          <a:fillRef idx="1">
+            <a:schemeClr val="accent1"/>
+          </a:fillRef>
+          <a:effectRef idx="0">
+            <a:schemeClr val="accent1"/>
+          </a:effectRef>
+          <a:fontRef idx="minor">
+            <a:schemeClr val="lt1"/>
+          </a:fontRef>
+        </p:style>
+        <p:txBody>
+          <a:bodyPr rtlCol="0" anchor="ctr"/>
+          <a:lstStyle/>
+          <a:p>
+            <a:pPr algn="ctr"/>
+            <a:r>
+              <a:rPr lang="en-US" dirty="0">
+                <a:solidFill>
+                  <a:srgbClr val="FF0000"/>
+                </a:solidFill>
+              </a:rPr>
+              <a:t>&lt;app&gt;</a:t>
+            </a:r>
+          </a:p>
+        </p:txBody>
+      </p:sp>
+      <p:sp>
+        <p:nvSpPr>
+          <p:cNvPr id="34" name="Arrow: Right 33">
+            <a:extLst>
+              <a:ext uri="{FF2B5EF4-FFF2-40B4-BE49-F238E27FC236}">
+                <a16:creationId xmlns:a16="http://schemas.microsoft.com/office/drawing/2014/main" id="{F15074B8-2DE2-45CE-BA9B-10738D97D0FF}"/>
+              </a:ext>
+            </a:extLst>
+          </p:cNvPr>
+          <p:cNvSpPr/>
+          <p:nvPr/>
+        </p:nvSpPr>
+        <p:spPr>
+          <a:xfrm>
+            <a:off x="2689828" y="3465536"/>
+            <a:ext cx="1055154" cy="305019"/>
+          </a:xfrm>
+          <a:prstGeom prst="rightArrow">
+            <a:avLst/>
+          </a:prstGeom>
+          <a:solidFill>
+            <a:schemeClr val="accent6"/>
+          </a:solidFill>
+        </p:spPr>
+        <p:style>
+          <a:lnRef idx="2">
+            <a:schemeClr val="accent1">
+              <a:shade val="50000"/>
+            </a:schemeClr>
+          </a:lnRef>
+          <a:fillRef idx="1">
+            <a:schemeClr val="accent1"/>
+          </a:fillRef>
+          <a:effectRef idx="0">
+            <a:schemeClr val="accent1"/>
+          </a:effectRef>
+          <a:fontRef idx="minor">
+            <a:schemeClr val="lt1"/>
+          </a:fontRef>
+        </p:style>
+        <p:txBody>
+          <a:bodyPr rtlCol="0" anchor="ctr"/>
+          <a:lstStyle/>
+          <a:p>
+            <a:pPr algn="ctr"/>
+            <a:endParaRPr lang="en-US"/>
+          </a:p>
+        </p:txBody>
+      </p:sp>
+      <p:sp>
+        <p:nvSpPr>
+          <p:cNvPr id="35" name="Arrow: Right 34">
+            <a:extLst>
+              <a:ext uri="{FF2B5EF4-FFF2-40B4-BE49-F238E27FC236}">
+                <a16:creationId xmlns:a16="http://schemas.microsoft.com/office/drawing/2014/main" id="{1F9DBD99-E068-4CC1-AEB0-9B616A85AA46}"/>
+              </a:ext>
+            </a:extLst>
+          </p:cNvPr>
+          <p:cNvSpPr/>
+          <p:nvPr/>
+        </p:nvSpPr>
+        <p:spPr>
+          <a:xfrm rot="10800000">
+            <a:off x="2665334" y="3931293"/>
+            <a:ext cx="1079647" cy="305018"/>
+          </a:xfrm>
+          <a:prstGeom prst="rightArrow">
+            <a:avLst>
+              <a:gd name="adj1" fmla="val 50000"/>
+              <a:gd name="adj2" fmla="val 50000"/>
+            </a:avLst>
+          </a:prstGeom>
+          <a:solidFill>
+            <a:srgbClr val="FF0000"/>
+          </a:solidFill>
+        </p:spPr>
+        <p:style>
+          <a:lnRef idx="2">
+            <a:schemeClr val="accent1">
+              <a:shade val="50000"/>
+            </a:schemeClr>
+          </a:lnRef>
+          <a:fillRef idx="1">
+            <a:schemeClr val="accent1"/>
+          </a:fillRef>
+          <a:effectRef idx="0">
+            <a:schemeClr val="accent1"/>
+          </a:effectRef>
+          <a:fontRef idx="minor">
+            <a:schemeClr val="lt1"/>
+          </a:fontRef>
+        </p:style>
+        <p:txBody>
+          <a:bodyPr rtlCol="0" anchor="ctr"/>
+          <a:lstStyle/>
+          <a:p>
+            <a:pPr algn="ctr"/>
+            <a:endParaRPr lang="en-US" dirty="0">
+              <a:solidFill>
+                <a:srgbClr val="FF0000"/>
+              </a:solidFill>
+            </a:endParaRPr>
+          </a:p>
+        </p:txBody>
+      </p:sp>
+      <p:sp>
+        <p:nvSpPr>
+          <p:cNvPr id="36" name="Rectangle 35">
+            <a:extLst>
+              <a:ext uri="{FF2B5EF4-FFF2-40B4-BE49-F238E27FC236}">
+                <a16:creationId xmlns:a16="http://schemas.microsoft.com/office/drawing/2014/main" id="{DB716CFE-3129-4EBB-8CB0-56FFD02584F4}"/>
+              </a:ext>
+            </a:extLst>
+          </p:cNvPr>
+          <p:cNvSpPr/>
+          <p:nvPr/>
+        </p:nvSpPr>
+        <p:spPr>
+          <a:xfrm>
+            <a:off x="4442326" y="3616043"/>
+            <a:ext cx="1687540" cy="613542"/>
+          </a:xfrm>
+          <a:prstGeom prst="rect">
+            <a:avLst/>
+          </a:prstGeom>
+          <a:solidFill>
+            <a:schemeClr val="bg1"/>
+          </a:solidFill>
+          <a:ln>
+            <a:solidFill>
+              <a:schemeClr val="bg1"/>
+            </a:solidFill>
+          </a:ln>
+        </p:spPr>
+        <p:style>
+          <a:lnRef idx="2">
+            <a:schemeClr val="accent1">
+              <a:shade val="50000"/>
+            </a:schemeClr>
+          </a:lnRef>
+          <a:fillRef idx="1">
+            <a:schemeClr val="accent1"/>
+          </a:fillRef>
+          <a:effectRef idx="0">
+            <a:schemeClr val="accent1"/>
+          </a:effectRef>
+          <a:fontRef idx="minor">
+            <a:schemeClr val="lt1"/>
+          </a:fontRef>
+        </p:style>
+        <p:txBody>
+          <a:bodyPr rtlCol="0" anchor="ctr"/>
+          <a:lstStyle/>
+          <a:p>
+            <a:pPr algn="ctr"/>
+            <a:r>
+              <a:rPr lang="en-US" dirty="0">
+                <a:solidFill>
+                  <a:srgbClr val="FF0000"/>
+                </a:solidFill>
+              </a:rPr>
+              <a:t>&lt;event view&gt;</a:t>
+            </a:r>
+          </a:p>
+          <a:p>
+            <a:pPr algn="ctr"/>
+            <a:r>
+              <a:rPr lang="en-US" sz="1400" dirty="0">
+                <a:solidFill>
+                  <a:schemeClr val="tx1"/>
+                </a:solidFill>
+              </a:rPr>
+              <a:t>EVENT[]</a:t>
+            </a:r>
+          </a:p>
+          <a:p>
+            <a:pPr algn="ctr"/>
+            <a:endParaRPr lang="en-US" dirty="0">
+              <a:solidFill>
+                <a:srgbClr val="FF0000"/>
+              </a:solidFill>
+            </a:endParaRPr>
+          </a:p>
+        </p:txBody>
+      </p:sp>
+      <p:sp>
+        <p:nvSpPr>
+          <p:cNvPr id="37" name="Rounded Rectangle 4">
+            <a:extLst>
+              <a:ext uri="{FF2B5EF4-FFF2-40B4-BE49-F238E27FC236}">
+                <a16:creationId xmlns:a16="http://schemas.microsoft.com/office/drawing/2014/main" id="{6B45F11C-793E-4038-9921-AC6B8CFFB644}"/>
+              </a:ext>
+            </a:extLst>
+          </p:cNvPr>
+          <p:cNvSpPr/>
+          <p:nvPr/>
+        </p:nvSpPr>
+        <p:spPr>
+          <a:xfrm>
+            <a:off x="8764168" y="1418239"/>
+            <a:ext cx="2232778" cy="1075795"/>
+          </a:xfrm>
+          <a:prstGeom prst="roundRect">
+            <a:avLst/>
+          </a:prstGeom>
+          <a:noFill/>
+          <a:ln>
+            <a:solidFill>
+              <a:srgbClr val="FF0000"/>
+            </a:solidFill>
+            <a:prstDash val="lgDash"/>
+          </a:ln>
+        </p:spPr>
+        <p:style>
+          <a:lnRef idx="2">
+            <a:schemeClr val="accent1">
+              <a:shade val="50000"/>
+            </a:schemeClr>
+          </a:lnRef>
+          <a:fillRef idx="1">
+            <a:schemeClr val="accent1"/>
+          </a:fillRef>
+          <a:effectRef idx="0">
+            <a:schemeClr val="accent1"/>
+          </a:effectRef>
+          <a:fontRef idx="minor">
+            <a:schemeClr val="lt1"/>
+          </a:fontRef>
+        </p:style>
+        <p:txBody>
+          <a:bodyPr rtlCol="0" anchor="ctr"/>
+          <a:lstStyle/>
+          <a:p>
+            <a:pPr algn="ctr"/>
+            <a:endParaRPr lang="en-US" sz="1372" dirty="0"/>
+          </a:p>
+        </p:txBody>
+      </p:sp>
+      <p:sp>
+        <p:nvSpPr>
+          <p:cNvPr id="38" name="Arrow: Right 37">
+            <a:extLst>
+              <a:ext uri="{FF2B5EF4-FFF2-40B4-BE49-F238E27FC236}">
+                <a16:creationId xmlns:a16="http://schemas.microsoft.com/office/drawing/2014/main" id="{5BD184A7-FBFC-447E-988D-B4BD449AA88C}"/>
+              </a:ext>
+            </a:extLst>
+          </p:cNvPr>
+          <p:cNvSpPr/>
+          <p:nvPr/>
+        </p:nvSpPr>
+        <p:spPr>
+          <a:xfrm>
+            <a:off x="6824136" y="1512818"/>
+            <a:ext cx="1302917" cy="305019"/>
+          </a:xfrm>
+          <a:prstGeom prst="rightArrow">
+            <a:avLst/>
+          </a:prstGeom>
+          <a:solidFill>
+            <a:schemeClr val="accent6"/>
+          </a:solidFill>
+        </p:spPr>
+        <p:style>
+          <a:lnRef idx="2">
+            <a:schemeClr val="accent1">
+              <a:shade val="50000"/>
+            </a:schemeClr>
+          </a:lnRef>
+          <a:fillRef idx="1">
+            <a:schemeClr val="accent1"/>
+          </a:fillRef>
+          <a:effectRef idx="0">
+            <a:schemeClr val="accent1"/>
+          </a:effectRef>
+          <a:fontRef idx="minor">
+            <a:schemeClr val="lt1"/>
+          </a:fontRef>
+        </p:style>
+        <p:txBody>
+          <a:bodyPr rtlCol="0" anchor="ctr"/>
+          <a:lstStyle/>
+          <a:p>
+            <a:pPr algn="ctr"/>
+            <a:endParaRPr lang="en-US" dirty="0"/>
+          </a:p>
+        </p:txBody>
+      </p:sp>
+      <p:sp>
+        <p:nvSpPr>
+          <p:cNvPr id="39" name="Arrow: Right 38">
+            <a:extLst>
+              <a:ext uri="{FF2B5EF4-FFF2-40B4-BE49-F238E27FC236}">
+                <a16:creationId xmlns:a16="http://schemas.microsoft.com/office/drawing/2014/main" id="{E1DD3E7D-3491-4E21-B576-7CFA890F2DBB}"/>
+              </a:ext>
+            </a:extLst>
+          </p:cNvPr>
+          <p:cNvSpPr/>
+          <p:nvPr/>
+        </p:nvSpPr>
+        <p:spPr>
+          <a:xfrm rot="10800000">
+            <a:off x="6824137" y="2063502"/>
+            <a:ext cx="1302916" cy="305018"/>
+          </a:xfrm>
+          <a:prstGeom prst="rightArrow">
+            <a:avLst>
+              <a:gd name="adj1" fmla="val 50000"/>
+              <a:gd name="adj2" fmla="val 50000"/>
+            </a:avLst>
+          </a:prstGeom>
+          <a:solidFill>
+            <a:srgbClr val="FF0000"/>
+          </a:solidFill>
+        </p:spPr>
+        <p:style>
+          <a:lnRef idx="2">
+            <a:schemeClr val="accent1">
+              <a:shade val="50000"/>
+            </a:schemeClr>
+          </a:lnRef>
+          <a:fillRef idx="1">
+            <a:schemeClr val="accent1"/>
+          </a:fillRef>
+          <a:effectRef idx="0">
+            <a:schemeClr val="accent1"/>
+          </a:effectRef>
+          <a:fontRef idx="minor">
+            <a:schemeClr val="lt1"/>
+          </a:fontRef>
+        </p:style>
+        <p:txBody>
+          <a:bodyPr rtlCol="0" anchor="ctr"/>
+          <a:lstStyle/>
+          <a:p>
+            <a:pPr algn="ctr"/>
+            <a:endParaRPr lang="en-US" dirty="0">
+              <a:solidFill>
+                <a:srgbClr val="FF0000"/>
+              </a:solidFill>
+            </a:endParaRPr>
+          </a:p>
+        </p:txBody>
+      </p:sp>
+      <p:sp>
+        <p:nvSpPr>
+          <p:cNvPr id="40" name="Rectangle 39">
+            <a:extLst>
+              <a:ext uri="{FF2B5EF4-FFF2-40B4-BE49-F238E27FC236}">
+                <a16:creationId xmlns:a16="http://schemas.microsoft.com/office/drawing/2014/main" id="{77D9EA1E-2CDB-4EA8-8C52-AA25D434E742}"/>
+              </a:ext>
+            </a:extLst>
+          </p:cNvPr>
+          <p:cNvSpPr/>
+          <p:nvPr/>
+        </p:nvSpPr>
+        <p:spPr>
+          <a:xfrm>
+            <a:off x="2501336" y="2948535"/>
+            <a:ext cx="1159118" cy="469151"/>
+          </a:xfrm>
+          <a:prstGeom prst="rect">
+            <a:avLst/>
+          </a:prstGeom>
+          <a:solidFill>
+            <a:schemeClr val="bg1"/>
+          </a:solidFill>
+          <a:ln>
+            <a:solidFill>
+              <a:schemeClr val="bg1"/>
+            </a:solidFill>
+          </a:ln>
+        </p:spPr>
+        <p:style>
+          <a:lnRef idx="2">
+            <a:schemeClr val="accent1">
+              <a:shade val="50000"/>
+            </a:schemeClr>
+          </a:lnRef>
+          <a:fillRef idx="1">
+            <a:schemeClr val="accent1"/>
+          </a:fillRef>
+          <a:effectRef idx="0">
+            <a:schemeClr val="accent1"/>
+          </a:effectRef>
+          <a:fontRef idx="minor">
+            <a:schemeClr val="lt1"/>
+          </a:fontRef>
+        </p:style>
+        <p:txBody>
+          <a:bodyPr rtlCol="0" anchor="ctr"/>
+          <a:lstStyle/>
+          <a:p>
+            <a:r>
+              <a:rPr lang="en-US" sz="1600" dirty="0">
+                <a:solidFill>
+                  <a:srgbClr val="FFC000"/>
+                </a:solidFill>
+              </a:rPr>
+              <a:t>PROVIDE</a:t>
+            </a:r>
+          </a:p>
+        </p:txBody>
+      </p:sp>
+      <p:sp>
+        <p:nvSpPr>
+          <p:cNvPr id="41" name="Rectangle 40">
+            <a:extLst>
+              <a:ext uri="{FF2B5EF4-FFF2-40B4-BE49-F238E27FC236}">
+                <a16:creationId xmlns:a16="http://schemas.microsoft.com/office/drawing/2014/main" id="{1E63DCB3-C081-49B1-94EA-189421ABD3CA}"/>
+              </a:ext>
+            </a:extLst>
+          </p:cNvPr>
+          <p:cNvSpPr/>
+          <p:nvPr/>
+        </p:nvSpPr>
+        <p:spPr>
+          <a:xfrm>
+            <a:off x="6815931" y="1195732"/>
+            <a:ext cx="841862" cy="305019"/>
+          </a:xfrm>
+          <a:prstGeom prst="rect">
+            <a:avLst/>
+          </a:prstGeom>
+          <a:solidFill>
+            <a:schemeClr val="bg1"/>
+          </a:solidFill>
+          <a:ln>
+            <a:solidFill>
+              <a:schemeClr val="bg1"/>
+            </a:solidFill>
+          </a:ln>
+        </p:spPr>
+        <p:style>
+          <a:lnRef idx="2">
+            <a:schemeClr val="accent1">
+              <a:shade val="50000"/>
+            </a:schemeClr>
+          </a:lnRef>
+          <a:fillRef idx="1">
+            <a:schemeClr val="accent1"/>
+          </a:fillRef>
+          <a:effectRef idx="0">
+            <a:schemeClr val="accent1"/>
+          </a:effectRef>
+          <a:fontRef idx="minor">
+            <a:schemeClr val="lt1"/>
+          </a:fontRef>
+        </p:style>
+        <p:txBody>
+          <a:bodyPr rtlCol="0" anchor="ctr"/>
+          <a:lstStyle/>
+          <a:p>
+            <a:r>
+              <a:rPr lang="en-US" sz="1600" dirty="0">
+                <a:solidFill>
+                  <a:srgbClr val="FFC000"/>
+                </a:solidFill>
+              </a:rPr>
+              <a:t>PROPS</a:t>
+            </a:r>
+            <a:r>
+              <a:rPr lang="en-US" sz="1400" dirty="0">
+                <a:solidFill>
+                  <a:srgbClr val="FFC000"/>
+                </a:solidFill>
+              </a:rPr>
+              <a:t> </a:t>
+            </a:r>
+          </a:p>
+        </p:txBody>
+      </p:sp>
+      <p:sp>
+        <p:nvSpPr>
+          <p:cNvPr id="42" name="Rectangle 41">
+            <a:extLst>
+              <a:ext uri="{FF2B5EF4-FFF2-40B4-BE49-F238E27FC236}">
+                <a16:creationId xmlns:a16="http://schemas.microsoft.com/office/drawing/2014/main" id="{BCDF880C-B808-48E5-A44D-3570229E29B0}"/>
+              </a:ext>
+            </a:extLst>
+          </p:cNvPr>
+          <p:cNvSpPr/>
+          <p:nvPr/>
+        </p:nvSpPr>
+        <p:spPr>
+          <a:xfrm>
+            <a:off x="7502467" y="1932505"/>
+            <a:ext cx="623090" cy="90516"/>
+          </a:xfrm>
+          <a:prstGeom prst="rect">
+            <a:avLst/>
+          </a:prstGeom>
+          <a:solidFill>
+            <a:schemeClr val="bg1"/>
+          </a:solidFill>
+          <a:ln>
+            <a:solidFill>
+              <a:schemeClr val="bg1"/>
+            </a:solidFill>
+          </a:ln>
+        </p:spPr>
+        <p:style>
+          <a:lnRef idx="2">
+            <a:schemeClr val="accent1">
+              <a:shade val="50000"/>
+            </a:schemeClr>
+          </a:lnRef>
+          <a:fillRef idx="1">
+            <a:schemeClr val="accent1"/>
+          </a:fillRef>
+          <a:effectRef idx="0">
+            <a:schemeClr val="accent1"/>
+          </a:effectRef>
+          <a:fontRef idx="minor">
+            <a:schemeClr val="lt1"/>
+          </a:fontRef>
+        </p:style>
+        <p:txBody>
+          <a:bodyPr rtlCol="0" anchor="ctr"/>
+          <a:lstStyle/>
+          <a:p>
+            <a:r>
+              <a:rPr lang="en-US" sz="1600" dirty="0">
+                <a:solidFill>
+                  <a:schemeClr val="accent1"/>
+                </a:solidFill>
+              </a:rPr>
+              <a:t>EMIT</a:t>
+            </a:r>
+            <a:r>
+              <a:rPr lang="en-US" sz="1400" dirty="0">
+                <a:solidFill>
+                  <a:srgbClr val="FFC000"/>
+                </a:solidFill>
+              </a:rPr>
+              <a:t> </a:t>
+            </a:r>
+          </a:p>
+        </p:txBody>
+      </p:sp>
+      <p:sp>
+        <p:nvSpPr>
+          <p:cNvPr id="43" name="Rectangle 42">
+            <a:extLst>
+              <a:ext uri="{FF2B5EF4-FFF2-40B4-BE49-F238E27FC236}">
+                <a16:creationId xmlns:a16="http://schemas.microsoft.com/office/drawing/2014/main" id="{052F3763-774F-4BEA-B66C-C9AECD1A6CA4}"/>
+              </a:ext>
+            </a:extLst>
+          </p:cNvPr>
+          <p:cNvSpPr/>
+          <p:nvPr/>
+        </p:nvSpPr>
+        <p:spPr>
+          <a:xfrm>
+            <a:off x="9075962" y="1844837"/>
+            <a:ext cx="1609189" cy="491962"/>
+          </a:xfrm>
+          <a:prstGeom prst="rect">
+            <a:avLst/>
+          </a:prstGeom>
+          <a:solidFill>
+            <a:schemeClr val="bg1"/>
+          </a:solidFill>
+          <a:ln>
+            <a:solidFill>
+              <a:schemeClr val="bg1"/>
+            </a:solidFill>
+          </a:ln>
+        </p:spPr>
+        <p:style>
+          <a:lnRef idx="2">
+            <a:schemeClr val="accent1">
+              <a:shade val="50000"/>
+            </a:schemeClr>
+          </a:lnRef>
+          <a:fillRef idx="1">
+            <a:schemeClr val="accent1"/>
+          </a:fillRef>
+          <a:effectRef idx="0">
+            <a:schemeClr val="accent1"/>
+          </a:effectRef>
+          <a:fontRef idx="minor">
+            <a:schemeClr val="lt1"/>
+          </a:fontRef>
+        </p:style>
+        <p:txBody>
+          <a:bodyPr rtlCol="0" anchor="ctr"/>
+          <a:lstStyle/>
+          <a:p>
+            <a:pPr algn="ctr"/>
+            <a:r>
+              <a:rPr lang="en-US" dirty="0">
+                <a:solidFill>
+                  <a:srgbClr val="FF0000"/>
+                </a:solidFill>
+              </a:rPr>
+              <a:t>&lt;create event&gt;</a:t>
+            </a:r>
+          </a:p>
+          <a:p>
+            <a:pPr algn="ctr"/>
+            <a:endParaRPr lang="en-US" dirty="0">
+              <a:solidFill>
+                <a:srgbClr val="FF0000"/>
+              </a:solidFill>
+            </a:endParaRPr>
+          </a:p>
+        </p:txBody>
+      </p:sp>
+      <p:sp>
+        <p:nvSpPr>
+          <p:cNvPr id="44" name="Rounded Rectangle 4">
+            <a:extLst>
+              <a:ext uri="{FF2B5EF4-FFF2-40B4-BE49-F238E27FC236}">
+                <a16:creationId xmlns:a16="http://schemas.microsoft.com/office/drawing/2014/main" id="{3DEBD1D0-1B52-488A-9434-1AE00CF7FD3F}"/>
+              </a:ext>
+            </a:extLst>
+          </p:cNvPr>
+          <p:cNvSpPr/>
+          <p:nvPr/>
+        </p:nvSpPr>
+        <p:spPr>
+          <a:xfrm>
+            <a:off x="8764168" y="2847020"/>
+            <a:ext cx="2232778" cy="1075795"/>
+          </a:xfrm>
+          <a:prstGeom prst="roundRect">
+            <a:avLst/>
+          </a:prstGeom>
+          <a:noFill/>
+          <a:ln>
+            <a:solidFill>
+              <a:srgbClr val="FF0000"/>
+            </a:solidFill>
+            <a:prstDash val="lgDash"/>
+          </a:ln>
+        </p:spPr>
+        <p:style>
+          <a:lnRef idx="2">
+            <a:schemeClr val="accent1">
+              <a:shade val="50000"/>
+            </a:schemeClr>
+          </a:lnRef>
+          <a:fillRef idx="1">
+            <a:schemeClr val="accent1"/>
+          </a:fillRef>
+          <a:effectRef idx="0">
+            <a:schemeClr val="accent1"/>
+          </a:effectRef>
+          <a:fontRef idx="minor">
+            <a:schemeClr val="lt1"/>
+          </a:fontRef>
+        </p:style>
+        <p:txBody>
+          <a:bodyPr rtlCol="0" anchor="ctr"/>
+          <a:lstStyle/>
+          <a:p>
+            <a:pPr algn="ctr"/>
+            <a:endParaRPr lang="en-US" sz="1372" dirty="0"/>
+          </a:p>
+        </p:txBody>
+      </p:sp>
+      <p:sp>
+        <p:nvSpPr>
+          <p:cNvPr id="45" name="Rectangle 44">
+            <a:extLst>
+              <a:ext uri="{FF2B5EF4-FFF2-40B4-BE49-F238E27FC236}">
+                <a16:creationId xmlns:a16="http://schemas.microsoft.com/office/drawing/2014/main" id="{8457C824-2E39-4CAF-AC6F-0B81AEA4E7E3}"/>
+              </a:ext>
+            </a:extLst>
+          </p:cNvPr>
+          <p:cNvSpPr/>
+          <p:nvPr/>
+        </p:nvSpPr>
+        <p:spPr>
+          <a:xfrm>
+            <a:off x="9105257" y="3279379"/>
+            <a:ext cx="1609189" cy="491962"/>
+          </a:xfrm>
+          <a:prstGeom prst="rect">
+            <a:avLst/>
+          </a:prstGeom>
+          <a:solidFill>
+            <a:schemeClr val="bg1"/>
+          </a:solidFill>
+          <a:ln>
+            <a:solidFill>
+              <a:schemeClr val="bg1"/>
+            </a:solidFill>
+          </a:ln>
+        </p:spPr>
+        <p:style>
+          <a:lnRef idx="2">
+            <a:schemeClr val="accent1">
+              <a:shade val="50000"/>
+            </a:schemeClr>
+          </a:lnRef>
+          <a:fillRef idx="1">
+            <a:schemeClr val="accent1"/>
+          </a:fillRef>
+          <a:effectRef idx="0">
+            <a:schemeClr val="accent1"/>
+          </a:effectRef>
+          <a:fontRef idx="minor">
+            <a:schemeClr val="lt1"/>
+          </a:fontRef>
+        </p:style>
+        <p:txBody>
+          <a:bodyPr rtlCol="0" anchor="ctr"/>
+          <a:lstStyle/>
+          <a:p>
+            <a:pPr algn="ctr"/>
+            <a:r>
+              <a:rPr lang="en-US" dirty="0">
+                <a:solidFill>
+                  <a:srgbClr val="FF0000"/>
+                </a:solidFill>
+              </a:rPr>
+              <a:t>&lt;event form&gt;</a:t>
+            </a:r>
+          </a:p>
+          <a:p>
+            <a:pPr algn="ctr"/>
+            <a:endParaRPr lang="en-US" dirty="0">
+              <a:solidFill>
+                <a:srgbClr val="FF0000"/>
+              </a:solidFill>
+            </a:endParaRPr>
+          </a:p>
+        </p:txBody>
+      </p:sp>
+      <p:sp>
+        <p:nvSpPr>
+          <p:cNvPr id="46" name="Rounded Rectangle 4">
+            <a:extLst>
+              <a:ext uri="{FF2B5EF4-FFF2-40B4-BE49-F238E27FC236}">
+                <a16:creationId xmlns:a16="http://schemas.microsoft.com/office/drawing/2014/main" id="{C6B1F497-8D79-4F15-98BC-82121B9F8179}"/>
+              </a:ext>
+            </a:extLst>
+          </p:cNvPr>
+          <p:cNvSpPr/>
+          <p:nvPr/>
+        </p:nvSpPr>
+        <p:spPr>
+          <a:xfrm>
+            <a:off x="8765937" y="4275138"/>
+            <a:ext cx="2232778" cy="1075795"/>
+          </a:xfrm>
+          <a:prstGeom prst="roundRect">
+            <a:avLst/>
+          </a:prstGeom>
+          <a:noFill/>
+          <a:ln>
+            <a:solidFill>
+              <a:srgbClr val="FF0000"/>
+            </a:solidFill>
+            <a:prstDash val="lgDash"/>
+          </a:ln>
+        </p:spPr>
+        <p:style>
+          <a:lnRef idx="2">
+            <a:schemeClr val="accent1">
+              <a:shade val="50000"/>
+            </a:schemeClr>
+          </a:lnRef>
+          <a:fillRef idx="1">
+            <a:schemeClr val="accent1"/>
+          </a:fillRef>
+          <a:effectRef idx="0">
+            <a:schemeClr val="accent1"/>
+          </a:effectRef>
+          <a:fontRef idx="minor">
+            <a:schemeClr val="lt1"/>
+          </a:fontRef>
+        </p:style>
+        <p:txBody>
+          <a:bodyPr rtlCol="0" anchor="ctr"/>
+          <a:lstStyle/>
+          <a:p>
+            <a:pPr algn="ctr"/>
+            <a:endParaRPr lang="en-US" sz="1372" dirty="0"/>
+          </a:p>
+        </p:txBody>
+      </p:sp>
+      <p:sp>
+        <p:nvSpPr>
+          <p:cNvPr id="47" name="Rectangle 46">
+            <a:extLst>
+              <a:ext uri="{FF2B5EF4-FFF2-40B4-BE49-F238E27FC236}">
+                <a16:creationId xmlns:a16="http://schemas.microsoft.com/office/drawing/2014/main" id="{E3B2B671-A061-4C61-BB2F-03796E228826}"/>
+              </a:ext>
+            </a:extLst>
+          </p:cNvPr>
+          <p:cNvSpPr/>
+          <p:nvPr/>
+        </p:nvSpPr>
+        <p:spPr>
+          <a:xfrm>
+            <a:off x="9105257" y="4706410"/>
+            <a:ext cx="1609189" cy="491962"/>
+          </a:xfrm>
+          <a:prstGeom prst="rect">
+            <a:avLst/>
+          </a:prstGeom>
+          <a:solidFill>
+            <a:schemeClr val="bg1"/>
+          </a:solidFill>
+          <a:ln>
+            <a:solidFill>
+              <a:schemeClr val="bg1"/>
+            </a:solidFill>
+          </a:ln>
+        </p:spPr>
+        <p:style>
+          <a:lnRef idx="2">
+            <a:schemeClr val="accent1">
+              <a:shade val="50000"/>
+            </a:schemeClr>
+          </a:lnRef>
+          <a:fillRef idx="1">
+            <a:schemeClr val="accent1"/>
+          </a:fillRef>
+          <a:effectRef idx="0">
+            <a:schemeClr val="accent1"/>
+          </a:effectRef>
+          <a:fontRef idx="minor">
+            <a:schemeClr val="lt1"/>
+          </a:fontRef>
+        </p:style>
+        <p:txBody>
+          <a:bodyPr rtlCol="0" anchor="ctr"/>
+          <a:lstStyle/>
+          <a:p>
+            <a:pPr algn="ctr"/>
+            <a:r>
+              <a:rPr lang="en-US" dirty="0">
+                <a:solidFill>
+                  <a:srgbClr val="FF0000"/>
+                </a:solidFill>
+              </a:rPr>
+              <a:t>&lt;event card&gt;</a:t>
+            </a:r>
+          </a:p>
+          <a:p>
+            <a:pPr algn="ctr"/>
+            <a:endParaRPr lang="en-US" dirty="0">
+              <a:solidFill>
+                <a:srgbClr val="FF0000"/>
+              </a:solidFill>
+            </a:endParaRPr>
+          </a:p>
+        </p:txBody>
+      </p:sp>
+      <p:sp>
+        <p:nvSpPr>
+          <p:cNvPr id="48" name="Rounded Rectangle 4">
+            <a:extLst>
+              <a:ext uri="{FF2B5EF4-FFF2-40B4-BE49-F238E27FC236}">
+                <a16:creationId xmlns:a16="http://schemas.microsoft.com/office/drawing/2014/main" id="{71A4AE2C-1124-49BE-938A-2A8664CD97A1}"/>
+              </a:ext>
+            </a:extLst>
+          </p:cNvPr>
+          <p:cNvSpPr/>
+          <p:nvPr/>
+        </p:nvSpPr>
+        <p:spPr>
+          <a:xfrm>
+            <a:off x="8751549" y="5782205"/>
+            <a:ext cx="2232778" cy="1075795"/>
+          </a:xfrm>
+          <a:prstGeom prst="roundRect">
+            <a:avLst/>
+          </a:prstGeom>
+          <a:noFill/>
+          <a:ln>
+            <a:solidFill>
+              <a:srgbClr val="FF0000"/>
+            </a:solidFill>
+            <a:prstDash val="lgDash"/>
+          </a:ln>
+        </p:spPr>
+        <p:style>
+          <a:lnRef idx="2">
+            <a:schemeClr val="accent1">
+              <a:shade val="50000"/>
+            </a:schemeClr>
+          </a:lnRef>
+          <a:fillRef idx="1">
+            <a:schemeClr val="accent1"/>
+          </a:fillRef>
+          <a:effectRef idx="0">
+            <a:schemeClr val="accent1"/>
+          </a:effectRef>
+          <a:fontRef idx="minor">
+            <a:schemeClr val="lt1"/>
+          </a:fontRef>
+        </p:style>
+        <p:txBody>
+          <a:bodyPr rtlCol="0" anchor="ctr"/>
+          <a:lstStyle/>
+          <a:p>
+            <a:pPr algn="ctr"/>
+            <a:endParaRPr lang="en-US" sz="1372" dirty="0"/>
+          </a:p>
+        </p:txBody>
+      </p:sp>
+      <p:sp>
+        <p:nvSpPr>
+          <p:cNvPr id="49" name="Rectangle 48">
+            <a:extLst>
+              <a:ext uri="{FF2B5EF4-FFF2-40B4-BE49-F238E27FC236}">
+                <a16:creationId xmlns:a16="http://schemas.microsoft.com/office/drawing/2014/main" id="{12238727-5066-4A75-90BA-7AAC5AD00ED0}"/>
+              </a:ext>
+            </a:extLst>
+          </p:cNvPr>
+          <p:cNvSpPr/>
+          <p:nvPr/>
+        </p:nvSpPr>
+        <p:spPr>
+          <a:xfrm>
+            <a:off x="9075962" y="6189575"/>
+            <a:ext cx="1761846" cy="491962"/>
+          </a:xfrm>
+          <a:prstGeom prst="rect">
+            <a:avLst/>
+          </a:prstGeom>
+          <a:solidFill>
+            <a:schemeClr val="bg1"/>
+          </a:solidFill>
+          <a:ln>
+            <a:solidFill>
+              <a:schemeClr val="bg1"/>
+            </a:solidFill>
+          </a:ln>
+        </p:spPr>
+        <p:style>
+          <a:lnRef idx="2">
+            <a:schemeClr val="accent1">
+              <a:shade val="50000"/>
+            </a:schemeClr>
+          </a:lnRef>
+          <a:fillRef idx="1">
+            <a:schemeClr val="accent1"/>
+          </a:fillRef>
+          <a:effectRef idx="0">
+            <a:schemeClr val="accent1"/>
+          </a:effectRef>
+          <a:fontRef idx="minor">
+            <a:schemeClr val="lt1"/>
+          </a:fontRef>
+        </p:style>
+        <p:txBody>
+          <a:bodyPr rtlCol="0" anchor="ctr"/>
+          <a:lstStyle/>
+          <a:p>
+            <a:pPr algn="ctr"/>
+            <a:r>
+              <a:rPr lang="en-US" dirty="0">
+                <a:solidFill>
+                  <a:srgbClr val="FF0000"/>
+                </a:solidFill>
+              </a:rPr>
+              <a:t>&lt;event update&gt;</a:t>
+            </a:r>
+          </a:p>
+          <a:p>
+            <a:pPr algn="ctr"/>
+            <a:endParaRPr lang="en-US" dirty="0">
+              <a:solidFill>
+                <a:srgbClr val="FF0000"/>
+              </a:solidFill>
+            </a:endParaRPr>
+          </a:p>
+        </p:txBody>
+      </p:sp>
+      <p:sp>
+        <p:nvSpPr>
+          <p:cNvPr id="50" name="Arrow: Right 49">
+            <a:extLst>
+              <a:ext uri="{FF2B5EF4-FFF2-40B4-BE49-F238E27FC236}">
+                <a16:creationId xmlns:a16="http://schemas.microsoft.com/office/drawing/2014/main" id="{2F26FED0-8056-4447-8D0F-F0D414410E0A}"/>
+              </a:ext>
+            </a:extLst>
+          </p:cNvPr>
+          <p:cNvSpPr/>
+          <p:nvPr/>
+        </p:nvSpPr>
+        <p:spPr>
+          <a:xfrm>
+            <a:off x="6837356" y="2999780"/>
+            <a:ext cx="1302917" cy="305019"/>
+          </a:xfrm>
+          <a:prstGeom prst="rightArrow">
+            <a:avLst/>
+          </a:prstGeom>
+          <a:solidFill>
+            <a:schemeClr val="accent6"/>
+          </a:solidFill>
+        </p:spPr>
+        <p:style>
+          <a:lnRef idx="2">
+            <a:schemeClr val="accent1">
+              <a:shade val="50000"/>
+            </a:schemeClr>
+          </a:lnRef>
+          <a:fillRef idx="1">
+            <a:schemeClr val="accent1"/>
+          </a:fillRef>
+          <a:effectRef idx="0">
+            <a:schemeClr val="accent1"/>
+          </a:effectRef>
+          <a:fontRef idx="minor">
+            <a:schemeClr val="lt1"/>
+          </a:fontRef>
+        </p:style>
+        <p:txBody>
+          <a:bodyPr rtlCol="0" anchor="ctr"/>
+          <a:lstStyle/>
+          <a:p>
+            <a:pPr algn="ctr"/>
+            <a:endParaRPr lang="en-US" dirty="0"/>
+          </a:p>
+        </p:txBody>
+      </p:sp>
+      <p:sp>
+        <p:nvSpPr>
+          <p:cNvPr id="51" name="Arrow: Right 50">
+            <a:extLst>
+              <a:ext uri="{FF2B5EF4-FFF2-40B4-BE49-F238E27FC236}">
+                <a16:creationId xmlns:a16="http://schemas.microsoft.com/office/drawing/2014/main" id="{B8DD9693-3C08-4073-AB5F-6E5BB5BFB35C}"/>
+              </a:ext>
+            </a:extLst>
+          </p:cNvPr>
+          <p:cNvSpPr/>
+          <p:nvPr/>
+        </p:nvSpPr>
+        <p:spPr>
+          <a:xfrm rot="10800000">
+            <a:off x="6837357" y="3550464"/>
+            <a:ext cx="1302916" cy="305018"/>
+          </a:xfrm>
+          <a:prstGeom prst="rightArrow">
+            <a:avLst>
+              <a:gd name="adj1" fmla="val 50000"/>
+              <a:gd name="adj2" fmla="val 50000"/>
+            </a:avLst>
+          </a:prstGeom>
+          <a:solidFill>
+            <a:srgbClr val="FF0000"/>
+          </a:solidFill>
+        </p:spPr>
+        <p:style>
+          <a:lnRef idx="2">
+            <a:schemeClr val="accent1">
+              <a:shade val="50000"/>
+            </a:schemeClr>
+          </a:lnRef>
+          <a:fillRef idx="1">
+            <a:schemeClr val="accent1"/>
+          </a:fillRef>
+          <a:effectRef idx="0">
+            <a:schemeClr val="accent1"/>
+          </a:effectRef>
+          <a:fontRef idx="minor">
+            <a:schemeClr val="lt1"/>
+          </a:fontRef>
+        </p:style>
+        <p:txBody>
+          <a:bodyPr rtlCol="0" anchor="ctr"/>
+          <a:lstStyle/>
+          <a:p>
+            <a:pPr algn="ctr"/>
+            <a:endParaRPr lang="en-US" dirty="0">
+              <a:solidFill>
+                <a:srgbClr val="FF0000"/>
+              </a:solidFill>
+            </a:endParaRPr>
+          </a:p>
+        </p:txBody>
+      </p:sp>
+      <p:sp>
+        <p:nvSpPr>
+          <p:cNvPr id="52" name="Rectangle 51">
+            <a:extLst>
+              <a:ext uri="{FF2B5EF4-FFF2-40B4-BE49-F238E27FC236}">
+                <a16:creationId xmlns:a16="http://schemas.microsoft.com/office/drawing/2014/main" id="{FC9C30AA-3F89-49BC-B672-CD6F88550621}"/>
+              </a:ext>
+            </a:extLst>
+          </p:cNvPr>
+          <p:cNvSpPr/>
+          <p:nvPr/>
+        </p:nvSpPr>
+        <p:spPr>
+          <a:xfrm>
+            <a:off x="6829151" y="2682694"/>
+            <a:ext cx="841862" cy="305019"/>
+          </a:xfrm>
+          <a:prstGeom prst="rect">
+            <a:avLst/>
+          </a:prstGeom>
+          <a:solidFill>
+            <a:schemeClr val="bg1"/>
+          </a:solidFill>
+          <a:ln>
+            <a:solidFill>
+              <a:schemeClr val="bg1"/>
+            </a:solidFill>
+          </a:ln>
+        </p:spPr>
+        <p:style>
+          <a:lnRef idx="2">
+            <a:schemeClr val="accent1">
+              <a:shade val="50000"/>
+            </a:schemeClr>
+          </a:lnRef>
+          <a:fillRef idx="1">
+            <a:schemeClr val="accent1"/>
+          </a:fillRef>
+          <a:effectRef idx="0">
+            <a:schemeClr val="accent1"/>
+          </a:effectRef>
+          <a:fontRef idx="minor">
+            <a:schemeClr val="lt1"/>
+          </a:fontRef>
+        </p:style>
+        <p:txBody>
+          <a:bodyPr rtlCol="0" anchor="ctr"/>
+          <a:lstStyle/>
+          <a:p>
+            <a:r>
+              <a:rPr lang="en-US" sz="1600" dirty="0">
+                <a:solidFill>
+                  <a:srgbClr val="FFC000"/>
+                </a:solidFill>
+              </a:rPr>
+              <a:t>PROPS</a:t>
+            </a:r>
+            <a:r>
+              <a:rPr lang="en-US" sz="1400" dirty="0">
+                <a:solidFill>
+                  <a:srgbClr val="FFC000"/>
+                </a:solidFill>
+              </a:rPr>
+              <a:t> </a:t>
+            </a:r>
+          </a:p>
+        </p:txBody>
+      </p:sp>
+      <p:sp>
+        <p:nvSpPr>
+          <p:cNvPr id="53" name="Rectangle 52">
+            <a:extLst>
+              <a:ext uri="{FF2B5EF4-FFF2-40B4-BE49-F238E27FC236}">
+                <a16:creationId xmlns:a16="http://schemas.microsoft.com/office/drawing/2014/main" id="{EBFC608E-1648-4896-BD3C-EBE405DD9B68}"/>
+              </a:ext>
+            </a:extLst>
+          </p:cNvPr>
+          <p:cNvSpPr/>
+          <p:nvPr/>
+        </p:nvSpPr>
+        <p:spPr>
+          <a:xfrm>
+            <a:off x="7349555" y="3404175"/>
+            <a:ext cx="740318" cy="134222"/>
+          </a:xfrm>
+          <a:prstGeom prst="rect">
+            <a:avLst/>
+          </a:prstGeom>
+          <a:solidFill>
+            <a:schemeClr val="bg1"/>
+          </a:solidFill>
+          <a:ln>
+            <a:solidFill>
+              <a:schemeClr val="bg1"/>
+            </a:solidFill>
+          </a:ln>
+        </p:spPr>
+        <p:style>
+          <a:lnRef idx="2">
+            <a:schemeClr val="accent1">
+              <a:shade val="50000"/>
+            </a:schemeClr>
+          </a:lnRef>
+          <a:fillRef idx="1">
+            <a:schemeClr val="accent1"/>
+          </a:fillRef>
+          <a:effectRef idx="0">
+            <a:schemeClr val="accent1"/>
+          </a:effectRef>
+          <a:fontRef idx="minor">
+            <a:schemeClr val="lt1"/>
+          </a:fontRef>
+        </p:style>
+        <p:txBody>
+          <a:bodyPr rtlCol="0" anchor="ctr"/>
+          <a:lstStyle/>
+          <a:p>
+            <a:r>
+              <a:rPr lang="en-US" sz="1600" dirty="0">
+                <a:ln w="0"/>
+                <a:solidFill>
+                  <a:schemeClr val="accent1"/>
+                </a:solidFill>
+                <a:effectLst>
+                  <a:outerShdw blurRad="38100" dist="25400" dir="5400000" algn="ctr" rotWithShape="0">
+                    <a:srgbClr val="6E747A">
+                      <a:alpha val="43000"/>
+                    </a:srgbClr>
+                  </a:outerShdw>
+                </a:effectLst>
+              </a:rPr>
+              <a:t>EMIT</a:t>
+            </a:r>
+            <a:r>
+              <a:rPr lang="en-US" sz="1400" dirty="0">
+                <a:solidFill>
+                  <a:srgbClr val="FFC000"/>
+                </a:solidFill>
+              </a:rPr>
+              <a:t> </a:t>
+            </a:r>
+          </a:p>
+        </p:txBody>
+      </p:sp>
+      <p:sp>
+        <p:nvSpPr>
+          <p:cNvPr id="54" name="Arrow: Right 53">
+            <a:extLst>
+              <a:ext uri="{FF2B5EF4-FFF2-40B4-BE49-F238E27FC236}">
+                <a16:creationId xmlns:a16="http://schemas.microsoft.com/office/drawing/2014/main" id="{9FA06F91-2FEE-4715-87DA-BA0D0902FE1E}"/>
+              </a:ext>
+            </a:extLst>
+          </p:cNvPr>
+          <p:cNvSpPr/>
+          <p:nvPr/>
+        </p:nvSpPr>
+        <p:spPr>
+          <a:xfrm>
+            <a:off x="6866683" y="4312408"/>
+            <a:ext cx="1302917" cy="305019"/>
+          </a:xfrm>
+          <a:prstGeom prst="rightArrow">
+            <a:avLst/>
+          </a:prstGeom>
+          <a:solidFill>
+            <a:schemeClr val="accent6"/>
+          </a:solidFill>
+        </p:spPr>
+        <p:style>
+          <a:lnRef idx="2">
+            <a:schemeClr val="accent1">
+              <a:shade val="50000"/>
+            </a:schemeClr>
+          </a:lnRef>
+          <a:fillRef idx="1">
+            <a:schemeClr val="accent1"/>
+          </a:fillRef>
+          <a:effectRef idx="0">
+            <a:schemeClr val="accent1"/>
+          </a:effectRef>
+          <a:fontRef idx="minor">
+            <a:schemeClr val="lt1"/>
+          </a:fontRef>
+        </p:style>
+        <p:txBody>
+          <a:bodyPr rtlCol="0" anchor="ctr"/>
+          <a:lstStyle/>
+          <a:p>
+            <a:pPr algn="ctr"/>
+            <a:endParaRPr lang="en-US" dirty="0"/>
+          </a:p>
+        </p:txBody>
+      </p:sp>
+      <p:sp>
+        <p:nvSpPr>
+          <p:cNvPr id="55" name="Arrow: Right 54">
+            <a:extLst>
+              <a:ext uri="{FF2B5EF4-FFF2-40B4-BE49-F238E27FC236}">
+                <a16:creationId xmlns:a16="http://schemas.microsoft.com/office/drawing/2014/main" id="{172996B6-C64A-4A74-8687-AE12F49A3FB1}"/>
+              </a:ext>
+            </a:extLst>
+          </p:cNvPr>
+          <p:cNvSpPr/>
+          <p:nvPr/>
+        </p:nvSpPr>
+        <p:spPr>
+          <a:xfrm rot="10800000">
+            <a:off x="6866684" y="4863092"/>
+            <a:ext cx="1302916" cy="305018"/>
+          </a:xfrm>
+          <a:prstGeom prst="rightArrow">
+            <a:avLst>
+              <a:gd name="adj1" fmla="val 50000"/>
+              <a:gd name="adj2" fmla="val 50000"/>
+            </a:avLst>
+          </a:prstGeom>
+          <a:solidFill>
+            <a:srgbClr val="FF0000"/>
+          </a:solidFill>
+        </p:spPr>
+        <p:style>
+          <a:lnRef idx="2">
+            <a:schemeClr val="accent1">
+              <a:shade val="50000"/>
+            </a:schemeClr>
+          </a:lnRef>
+          <a:fillRef idx="1">
+            <a:schemeClr val="accent1"/>
+          </a:fillRef>
+          <a:effectRef idx="0">
+            <a:schemeClr val="accent1"/>
+          </a:effectRef>
+          <a:fontRef idx="minor">
+            <a:schemeClr val="lt1"/>
+          </a:fontRef>
+        </p:style>
+        <p:txBody>
+          <a:bodyPr rtlCol="0" anchor="ctr"/>
+          <a:lstStyle/>
+          <a:p>
+            <a:pPr algn="ctr"/>
+            <a:endParaRPr lang="en-US" dirty="0">
+              <a:solidFill>
+                <a:srgbClr val="FF0000"/>
+              </a:solidFill>
+            </a:endParaRPr>
+          </a:p>
+        </p:txBody>
+      </p:sp>
+      <p:sp>
+        <p:nvSpPr>
+          <p:cNvPr id="56" name="Rectangle 55">
+            <a:extLst>
+              <a:ext uri="{FF2B5EF4-FFF2-40B4-BE49-F238E27FC236}">
+                <a16:creationId xmlns:a16="http://schemas.microsoft.com/office/drawing/2014/main" id="{9DDF3FF0-DE33-4E17-961A-A4F8273357DC}"/>
+              </a:ext>
+            </a:extLst>
+          </p:cNvPr>
+          <p:cNvSpPr/>
+          <p:nvPr/>
+        </p:nvSpPr>
+        <p:spPr>
+          <a:xfrm>
+            <a:off x="6858478" y="3995322"/>
+            <a:ext cx="841862" cy="305019"/>
+          </a:xfrm>
+          <a:prstGeom prst="rect">
+            <a:avLst/>
+          </a:prstGeom>
+          <a:solidFill>
+            <a:schemeClr val="bg1"/>
+          </a:solidFill>
+          <a:ln>
+            <a:solidFill>
+              <a:schemeClr val="bg1"/>
+            </a:solidFill>
+          </a:ln>
+        </p:spPr>
+        <p:style>
+          <a:lnRef idx="2">
+            <a:schemeClr val="accent1">
+              <a:shade val="50000"/>
+            </a:schemeClr>
+          </a:lnRef>
+          <a:fillRef idx="1">
+            <a:schemeClr val="accent1"/>
+          </a:fillRef>
+          <a:effectRef idx="0">
+            <a:schemeClr val="accent1"/>
+          </a:effectRef>
+          <a:fontRef idx="minor">
+            <a:schemeClr val="lt1"/>
+          </a:fontRef>
+        </p:style>
+        <p:txBody>
+          <a:bodyPr rtlCol="0" anchor="ctr"/>
+          <a:lstStyle/>
+          <a:p>
+            <a:r>
+              <a:rPr lang="en-US" sz="1600" dirty="0">
+                <a:solidFill>
+                  <a:srgbClr val="FFC000"/>
+                </a:solidFill>
+              </a:rPr>
+              <a:t>Props</a:t>
+            </a:r>
+            <a:r>
+              <a:rPr lang="en-US" sz="1400" dirty="0">
+                <a:solidFill>
+                  <a:srgbClr val="FFC000"/>
+                </a:solidFill>
+              </a:rPr>
+              <a:t> </a:t>
+            </a:r>
+          </a:p>
+        </p:txBody>
+      </p:sp>
+      <p:sp>
+        <p:nvSpPr>
+          <p:cNvPr id="57" name="Rectangle 56">
+            <a:extLst>
+              <a:ext uri="{FF2B5EF4-FFF2-40B4-BE49-F238E27FC236}">
+                <a16:creationId xmlns:a16="http://schemas.microsoft.com/office/drawing/2014/main" id="{BE9697C0-E7E3-42A1-B900-F1EE2F0FE8C8}"/>
+              </a:ext>
+            </a:extLst>
+          </p:cNvPr>
+          <p:cNvSpPr/>
+          <p:nvPr/>
+        </p:nvSpPr>
+        <p:spPr>
+          <a:xfrm>
+            <a:off x="7427786" y="4642929"/>
+            <a:ext cx="740318" cy="151718"/>
+          </a:xfrm>
+          <a:prstGeom prst="rect">
+            <a:avLst/>
+          </a:prstGeom>
+          <a:solidFill>
+            <a:schemeClr val="bg1"/>
+          </a:solidFill>
+          <a:ln>
+            <a:solidFill>
+              <a:schemeClr val="bg1"/>
+            </a:solidFill>
+          </a:ln>
+        </p:spPr>
+        <p:style>
+          <a:lnRef idx="2">
+            <a:schemeClr val="accent1">
+              <a:shade val="50000"/>
+            </a:schemeClr>
+          </a:lnRef>
+          <a:fillRef idx="1">
+            <a:schemeClr val="accent1"/>
+          </a:fillRef>
+          <a:effectRef idx="0">
+            <a:schemeClr val="accent1"/>
+          </a:effectRef>
+          <a:fontRef idx="minor">
+            <a:schemeClr val="lt1"/>
+          </a:fontRef>
+        </p:style>
+        <p:txBody>
+          <a:bodyPr rtlCol="0" anchor="ctr"/>
+          <a:lstStyle/>
+          <a:p>
+            <a:r>
+              <a:rPr lang="en-US" sz="1600" dirty="0">
+                <a:solidFill>
+                  <a:schemeClr val="accent1"/>
+                </a:solidFill>
+              </a:rPr>
+              <a:t>EMIT</a:t>
+            </a:r>
+            <a:r>
+              <a:rPr lang="en-US" sz="1400" dirty="0">
+                <a:solidFill>
+                  <a:srgbClr val="FFC000"/>
+                </a:solidFill>
+              </a:rPr>
+              <a:t> </a:t>
+            </a:r>
+          </a:p>
+        </p:txBody>
+      </p:sp>
+      <p:sp>
+        <p:nvSpPr>
+          <p:cNvPr id="58" name="Arrow: Right 57">
+            <a:extLst>
+              <a:ext uri="{FF2B5EF4-FFF2-40B4-BE49-F238E27FC236}">
+                <a16:creationId xmlns:a16="http://schemas.microsoft.com/office/drawing/2014/main" id="{BB3DBB45-D4BA-4DB8-8864-4D2C155734B0}"/>
+              </a:ext>
+            </a:extLst>
+          </p:cNvPr>
+          <p:cNvSpPr/>
+          <p:nvPr/>
+        </p:nvSpPr>
+        <p:spPr>
+          <a:xfrm>
+            <a:off x="6866683" y="5825835"/>
+            <a:ext cx="1302917" cy="305019"/>
+          </a:xfrm>
+          <a:prstGeom prst="rightArrow">
+            <a:avLst/>
+          </a:prstGeom>
+          <a:solidFill>
+            <a:schemeClr val="accent6"/>
+          </a:solidFill>
+        </p:spPr>
+        <p:style>
+          <a:lnRef idx="2">
+            <a:schemeClr val="accent1">
+              <a:shade val="50000"/>
+            </a:schemeClr>
+          </a:lnRef>
+          <a:fillRef idx="1">
+            <a:schemeClr val="accent1"/>
+          </a:fillRef>
+          <a:effectRef idx="0">
+            <a:schemeClr val="accent1"/>
+          </a:effectRef>
+          <a:fontRef idx="minor">
+            <a:schemeClr val="lt1"/>
+          </a:fontRef>
+        </p:style>
+        <p:txBody>
+          <a:bodyPr rtlCol="0" anchor="ctr"/>
+          <a:lstStyle/>
+          <a:p>
+            <a:pPr algn="ctr"/>
+            <a:endParaRPr lang="en-US" dirty="0"/>
+          </a:p>
+        </p:txBody>
+      </p:sp>
+      <p:sp>
+        <p:nvSpPr>
+          <p:cNvPr id="59" name="Arrow: Right 58">
+            <a:extLst>
+              <a:ext uri="{FF2B5EF4-FFF2-40B4-BE49-F238E27FC236}">
+                <a16:creationId xmlns:a16="http://schemas.microsoft.com/office/drawing/2014/main" id="{83B17119-D179-4DB4-816F-8D44CEC1DDA1}"/>
+              </a:ext>
+            </a:extLst>
+          </p:cNvPr>
+          <p:cNvSpPr/>
+          <p:nvPr/>
+        </p:nvSpPr>
+        <p:spPr>
+          <a:xfrm rot="10800000">
+            <a:off x="6866684" y="6376519"/>
+            <a:ext cx="1302916" cy="305018"/>
+          </a:xfrm>
+          <a:prstGeom prst="rightArrow">
+            <a:avLst>
+              <a:gd name="adj1" fmla="val 50000"/>
+              <a:gd name="adj2" fmla="val 50000"/>
+            </a:avLst>
+          </a:prstGeom>
+          <a:solidFill>
+            <a:srgbClr val="FF0000"/>
+          </a:solidFill>
+        </p:spPr>
+        <p:style>
+          <a:lnRef idx="2">
+            <a:schemeClr val="accent1">
+              <a:shade val="50000"/>
+            </a:schemeClr>
+          </a:lnRef>
+          <a:fillRef idx="1">
+            <a:schemeClr val="accent1"/>
+          </a:fillRef>
+          <a:effectRef idx="0">
+            <a:schemeClr val="accent1"/>
+          </a:effectRef>
+          <a:fontRef idx="minor">
+            <a:schemeClr val="lt1"/>
+          </a:fontRef>
+        </p:style>
+        <p:txBody>
+          <a:bodyPr rtlCol="0" anchor="ctr"/>
+          <a:lstStyle/>
+          <a:p>
+            <a:pPr algn="ctr"/>
+            <a:endParaRPr lang="en-US" dirty="0">
+              <a:solidFill>
+                <a:srgbClr val="FF0000"/>
+              </a:solidFill>
+            </a:endParaRPr>
+          </a:p>
+        </p:txBody>
+      </p:sp>
+      <p:sp>
+        <p:nvSpPr>
+          <p:cNvPr id="60" name="Rectangle 59">
+            <a:extLst>
+              <a:ext uri="{FF2B5EF4-FFF2-40B4-BE49-F238E27FC236}">
+                <a16:creationId xmlns:a16="http://schemas.microsoft.com/office/drawing/2014/main" id="{677FC308-5CAE-4D30-9431-9872FE532A4D}"/>
+              </a:ext>
+            </a:extLst>
+          </p:cNvPr>
+          <p:cNvSpPr/>
+          <p:nvPr/>
+        </p:nvSpPr>
+        <p:spPr>
+          <a:xfrm>
+            <a:off x="6858478" y="5508749"/>
+            <a:ext cx="841862" cy="305019"/>
+          </a:xfrm>
+          <a:prstGeom prst="rect">
+            <a:avLst/>
+          </a:prstGeom>
+          <a:solidFill>
+            <a:schemeClr val="bg1"/>
+          </a:solidFill>
+          <a:ln>
+            <a:solidFill>
+              <a:schemeClr val="bg1"/>
+            </a:solidFill>
+          </a:ln>
+        </p:spPr>
+        <p:style>
+          <a:lnRef idx="2">
+            <a:schemeClr val="accent1">
+              <a:shade val="50000"/>
+            </a:schemeClr>
+          </a:lnRef>
+          <a:fillRef idx="1">
+            <a:schemeClr val="accent1"/>
+          </a:fillRef>
+          <a:effectRef idx="0">
+            <a:schemeClr val="accent1"/>
+          </a:effectRef>
+          <a:fontRef idx="minor">
+            <a:schemeClr val="lt1"/>
+          </a:fontRef>
+        </p:style>
+        <p:txBody>
+          <a:bodyPr rtlCol="0" anchor="ctr"/>
+          <a:lstStyle/>
+          <a:p>
+            <a:r>
+              <a:rPr lang="en-US" sz="1600" dirty="0">
+                <a:solidFill>
+                  <a:srgbClr val="FFC000"/>
+                </a:solidFill>
+              </a:rPr>
+              <a:t>Props</a:t>
+            </a:r>
+            <a:r>
+              <a:rPr lang="en-US" sz="1400" dirty="0">
+                <a:solidFill>
+                  <a:srgbClr val="FFC000"/>
+                </a:solidFill>
+              </a:rPr>
+              <a:t> </a:t>
+            </a:r>
+          </a:p>
+        </p:txBody>
+      </p:sp>
+      <p:sp>
+        <p:nvSpPr>
+          <p:cNvPr id="61" name="Rectangle 60">
+            <a:extLst>
+              <a:ext uri="{FF2B5EF4-FFF2-40B4-BE49-F238E27FC236}">
+                <a16:creationId xmlns:a16="http://schemas.microsoft.com/office/drawing/2014/main" id="{F314D9B0-E839-4C3C-AB8A-A16C2E1D5D5A}"/>
+              </a:ext>
+            </a:extLst>
+          </p:cNvPr>
+          <p:cNvSpPr/>
+          <p:nvPr/>
+        </p:nvSpPr>
+        <p:spPr>
+          <a:xfrm>
+            <a:off x="7518142" y="6199300"/>
+            <a:ext cx="649962" cy="108774"/>
+          </a:xfrm>
+          <a:prstGeom prst="rect">
+            <a:avLst/>
+          </a:prstGeom>
+          <a:solidFill>
+            <a:schemeClr val="bg1"/>
+          </a:solidFill>
+          <a:ln>
+            <a:solidFill>
+              <a:schemeClr val="bg1"/>
+            </a:solidFill>
+          </a:ln>
+        </p:spPr>
+        <p:style>
+          <a:lnRef idx="2">
+            <a:schemeClr val="accent1">
+              <a:shade val="50000"/>
+            </a:schemeClr>
+          </a:lnRef>
+          <a:fillRef idx="1">
+            <a:schemeClr val="accent1"/>
+          </a:fillRef>
+          <a:effectRef idx="0">
+            <a:schemeClr val="accent1"/>
+          </a:effectRef>
+          <a:fontRef idx="minor">
+            <a:schemeClr val="lt1"/>
+          </a:fontRef>
+        </p:style>
+        <p:txBody>
+          <a:bodyPr rtlCol="0" anchor="ctr"/>
+          <a:lstStyle/>
+          <a:p>
+            <a:r>
+              <a:rPr lang="en-US" sz="1600" dirty="0">
+                <a:solidFill>
+                  <a:schemeClr val="accent1"/>
+                </a:solidFill>
+              </a:rPr>
+              <a:t>EMIT</a:t>
+            </a:r>
+            <a:r>
+              <a:rPr lang="en-US" sz="1400" dirty="0">
+                <a:solidFill>
+                  <a:srgbClr val="FFC000"/>
+                </a:solidFill>
+              </a:rPr>
+              <a:t> </a:t>
+            </a:r>
+          </a:p>
+        </p:txBody>
+      </p:sp>
+      <p:sp>
+        <p:nvSpPr>
+          <p:cNvPr id="63" name="Rectangle 62">
+            <a:extLst>
+              <a:ext uri="{FF2B5EF4-FFF2-40B4-BE49-F238E27FC236}">
+                <a16:creationId xmlns:a16="http://schemas.microsoft.com/office/drawing/2014/main" id="{4BD32EC1-4098-4E74-8EE0-A05D685FF135}"/>
+              </a:ext>
+            </a:extLst>
+          </p:cNvPr>
+          <p:cNvSpPr/>
+          <p:nvPr/>
+        </p:nvSpPr>
+        <p:spPr>
+          <a:xfrm>
+            <a:off x="5077633" y="278280"/>
+            <a:ext cx="3012240" cy="613035"/>
+          </a:xfrm>
+          <a:prstGeom prst="rect">
+            <a:avLst/>
+          </a:prstGeom>
+          <a:solidFill>
+            <a:schemeClr val="bg1"/>
+          </a:solidFill>
+          <a:ln>
+            <a:solidFill>
+              <a:schemeClr val="bg1"/>
+            </a:solidFill>
+          </a:ln>
+        </p:spPr>
+        <p:style>
+          <a:lnRef idx="2">
+            <a:schemeClr val="accent1">
+              <a:shade val="50000"/>
+            </a:schemeClr>
+          </a:lnRef>
+          <a:fillRef idx="1">
+            <a:schemeClr val="accent1"/>
+          </a:fillRef>
+          <a:effectRef idx="0">
+            <a:schemeClr val="accent1"/>
+          </a:effectRef>
+          <a:fontRef idx="minor">
+            <a:schemeClr val="lt1"/>
+          </a:fontRef>
+        </p:style>
+        <p:txBody>
+          <a:bodyPr rtlCol="0" anchor="ctr"/>
+          <a:lstStyle/>
+          <a:p>
+            <a:pPr algn="ctr"/>
+            <a:r>
+              <a:rPr lang="en-US" b="1" dirty="0">
+                <a:solidFill>
+                  <a:schemeClr val="tx1"/>
+                </a:solidFill>
+              </a:rPr>
+              <a:t>Event component diagram </a:t>
+            </a:r>
+          </a:p>
+        </p:txBody>
+      </p:sp>
+    </p:spTree>
+    <p:extLst>
+      <p:ext uri="{BB962C8B-B14F-4D97-AF65-F5344CB8AC3E}">
+        <p14:creationId xmlns:p14="http://schemas.microsoft.com/office/powerpoint/2010/main" val="2090760421"/>
+      </p:ext>
+    </p:extLst>
+  </p:cSld>
+  <p:clrMapOvr>
+    <a:masterClrMapping/>
+  </p:clrMapOvr>
+</p:sld>
+</file>
+
 <file path=ppt/theme/theme1.xml><?xml version="1.0" encoding="utf-8"?>
 <a:theme xmlns:a="http://schemas.openxmlformats.org/drawingml/2006/main" name="Office Theme">
   <a:themeElements>

</xml_diff>